<commit_message>
figures 3 and 4
</commit_message>
<xml_diff>
--- a/plots/Fig4.pptx
+++ b/plots/Fig4.pptx
@@ -241,11 +241,11 @@
           <a:bodyPr/>
           <a:lstStyle/>
           <a:p>
-            <a:fld id="{9F950D6D-D638-944C-997A-9DAC4E6CC4FC}" type="datetimeFigureOut">
-              <a:rPr lang="en-FI" smtClean="0"/>
-              <a:t>10.3.2022</a:t>
+            <a:fld id="{A8964ADD-0953-8940-9E96-FB0BF4E5F7EB}" type="datetimeFigureOut">
+              <a:rPr lang="en-GB" smtClean="0"/>
+              <a:t>12/04/2022</a:t>
             </a:fld>
-            <a:endParaRPr lang="en-FI"/>
+            <a:endParaRPr lang="en-GB"/>
           </a:p>
         </p:txBody>
       </p:sp>
@@ -264,7 +264,7 @@
           <a:bodyPr/>
           <a:lstStyle/>
           <a:p>
-            <a:endParaRPr lang="en-FI"/>
+            <a:endParaRPr lang="en-GB"/>
           </a:p>
         </p:txBody>
       </p:sp>
@@ -283,18 +283,18 @@
           <a:bodyPr/>
           <a:lstStyle/>
           <a:p>
-            <a:fld id="{D0100814-528C-1E43-A96A-17574B552906}" type="slidenum">
-              <a:rPr lang="en-FI" smtClean="0"/>
+            <a:fld id="{176483DE-1650-D24E-B86E-522C5B187573}" type="slidenum">
+              <a:rPr lang="en-GB" smtClean="0"/>
               <a:t>‹#›</a:t>
             </a:fld>
-            <a:endParaRPr lang="en-FI"/>
+            <a:endParaRPr lang="en-GB"/>
           </a:p>
         </p:txBody>
       </p:sp>
     </p:spTree>
     <p:extLst>
       <p:ext uri="{BB962C8B-B14F-4D97-AF65-F5344CB8AC3E}">
-        <p14:creationId xmlns:p14="http://schemas.microsoft.com/office/powerpoint/2010/main" val="636538954"/>
+        <p14:creationId xmlns:p14="http://schemas.microsoft.com/office/powerpoint/2010/main" val="498734614"/>
       </p:ext>
     </p:extLst>
   </p:cSld>
@@ -411,11 +411,11 @@
           <a:bodyPr/>
           <a:lstStyle/>
           <a:p>
-            <a:fld id="{9F950D6D-D638-944C-997A-9DAC4E6CC4FC}" type="datetimeFigureOut">
-              <a:rPr lang="en-FI" smtClean="0"/>
-              <a:t>10.3.2022</a:t>
+            <a:fld id="{A8964ADD-0953-8940-9E96-FB0BF4E5F7EB}" type="datetimeFigureOut">
+              <a:rPr lang="en-GB" smtClean="0"/>
+              <a:t>12/04/2022</a:t>
             </a:fld>
-            <a:endParaRPr lang="en-FI"/>
+            <a:endParaRPr lang="en-GB"/>
           </a:p>
         </p:txBody>
       </p:sp>
@@ -434,7 +434,7 @@
           <a:bodyPr/>
           <a:lstStyle/>
           <a:p>
-            <a:endParaRPr lang="en-FI"/>
+            <a:endParaRPr lang="en-GB"/>
           </a:p>
         </p:txBody>
       </p:sp>
@@ -453,18 +453,18 @@
           <a:bodyPr/>
           <a:lstStyle/>
           <a:p>
-            <a:fld id="{D0100814-528C-1E43-A96A-17574B552906}" type="slidenum">
-              <a:rPr lang="en-FI" smtClean="0"/>
+            <a:fld id="{176483DE-1650-D24E-B86E-522C5B187573}" type="slidenum">
+              <a:rPr lang="en-GB" smtClean="0"/>
               <a:t>‹#›</a:t>
             </a:fld>
-            <a:endParaRPr lang="en-FI"/>
+            <a:endParaRPr lang="en-GB"/>
           </a:p>
         </p:txBody>
       </p:sp>
     </p:spTree>
     <p:extLst>
       <p:ext uri="{BB962C8B-B14F-4D97-AF65-F5344CB8AC3E}">
-        <p14:creationId xmlns:p14="http://schemas.microsoft.com/office/powerpoint/2010/main" val="2173804309"/>
+        <p14:creationId xmlns:p14="http://schemas.microsoft.com/office/powerpoint/2010/main" val="295953268"/>
       </p:ext>
     </p:extLst>
   </p:cSld>
@@ -591,11 +591,11 @@
           <a:bodyPr/>
           <a:lstStyle/>
           <a:p>
-            <a:fld id="{9F950D6D-D638-944C-997A-9DAC4E6CC4FC}" type="datetimeFigureOut">
-              <a:rPr lang="en-FI" smtClean="0"/>
-              <a:t>10.3.2022</a:t>
+            <a:fld id="{A8964ADD-0953-8940-9E96-FB0BF4E5F7EB}" type="datetimeFigureOut">
+              <a:rPr lang="en-GB" smtClean="0"/>
+              <a:t>12/04/2022</a:t>
             </a:fld>
-            <a:endParaRPr lang="en-FI"/>
+            <a:endParaRPr lang="en-GB"/>
           </a:p>
         </p:txBody>
       </p:sp>
@@ -614,7 +614,7 @@
           <a:bodyPr/>
           <a:lstStyle/>
           <a:p>
-            <a:endParaRPr lang="en-FI"/>
+            <a:endParaRPr lang="en-GB"/>
           </a:p>
         </p:txBody>
       </p:sp>
@@ -633,18 +633,18 @@
           <a:bodyPr/>
           <a:lstStyle/>
           <a:p>
-            <a:fld id="{D0100814-528C-1E43-A96A-17574B552906}" type="slidenum">
-              <a:rPr lang="en-FI" smtClean="0"/>
+            <a:fld id="{176483DE-1650-D24E-B86E-522C5B187573}" type="slidenum">
+              <a:rPr lang="en-GB" smtClean="0"/>
               <a:t>‹#›</a:t>
             </a:fld>
-            <a:endParaRPr lang="en-FI"/>
+            <a:endParaRPr lang="en-GB"/>
           </a:p>
         </p:txBody>
       </p:sp>
     </p:spTree>
     <p:extLst>
       <p:ext uri="{BB962C8B-B14F-4D97-AF65-F5344CB8AC3E}">
-        <p14:creationId xmlns:p14="http://schemas.microsoft.com/office/powerpoint/2010/main" val="862618714"/>
+        <p14:creationId xmlns:p14="http://schemas.microsoft.com/office/powerpoint/2010/main" val="2319408500"/>
       </p:ext>
     </p:extLst>
   </p:cSld>
@@ -761,11 +761,11 @@
           <a:bodyPr/>
           <a:lstStyle/>
           <a:p>
-            <a:fld id="{9F950D6D-D638-944C-997A-9DAC4E6CC4FC}" type="datetimeFigureOut">
-              <a:rPr lang="en-FI" smtClean="0"/>
-              <a:t>10.3.2022</a:t>
+            <a:fld id="{A8964ADD-0953-8940-9E96-FB0BF4E5F7EB}" type="datetimeFigureOut">
+              <a:rPr lang="en-GB" smtClean="0"/>
+              <a:t>12/04/2022</a:t>
             </a:fld>
-            <a:endParaRPr lang="en-FI"/>
+            <a:endParaRPr lang="en-GB"/>
           </a:p>
         </p:txBody>
       </p:sp>
@@ -784,7 +784,7 @@
           <a:bodyPr/>
           <a:lstStyle/>
           <a:p>
-            <a:endParaRPr lang="en-FI"/>
+            <a:endParaRPr lang="en-GB"/>
           </a:p>
         </p:txBody>
       </p:sp>
@@ -803,18 +803,18 @@
           <a:bodyPr/>
           <a:lstStyle/>
           <a:p>
-            <a:fld id="{D0100814-528C-1E43-A96A-17574B552906}" type="slidenum">
-              <a:rPr lang="en-FI" smtClean="0"/>
+            <a:fld id="{176483DE-1650-D24E-B86E-522C5B187573}" type="slidenum">
+              <a:rPr lang="en-GB" smtClean="0"/>
               <a:t>‹#›</a:t>
             </a:fld>
-            <a:endParaRPr lang="en-FI"/>
+            <a:endParaRPr lang="en-GB"/>
           </a:p>
         </p:txBody>
       </p:sp>
     </p:spTree>
     <p:extLst>
       <p:ext uri="{BB962C8B-B14F-4D97-AF65-F5344CB8AC3E}">
-        <p14:creationId xmlns:p14="http://schemas.microsoft.com/office/powerpoint/2010/main" val="3086651619"/>
+        <p14:creationId xmlns:p14="http://schemas.microsoft.com/office/powerpoint/2010/main" val="4168203773"/>
       </p:ext>
     </p:extLst>
   </p:cSld>
@@ -1005,11 +1005,11 @@
           <a:bodyPr/>
           <a:lstStyle/>
           <a:p>
-            <a:fld id="{9F950D6D-D638-944C-997A-9DAC4E6CC4FC}" type="datetimeFigureOut">
-              <a:rPr lang="en-FI" smtClean="0"/>
-              <a:t>10.3.2022</a:t>
+            <a:fld id="{A8964ADD-0953-8940-9E96-FB0BF4E5F7EB}" type="datetimeFigureOut">
+              <a:rPr lang="en-GB" smtClean="0"/>
+              <a:t>12/04/2022</a:t>
             </a:fld>
-            <a:endParaRPr lang="en-FI"/>
+            <a:endParaRPr lang="en-GB"/>
           </a:p>
         </p:txBody>
       </p:sp>
@@ -1028,7 +1028,7 @@
           <a:bodyPr/>
           <a:lstStyle/>
           <a:p>
-            <a:endParaRPr lang="en-FI"/>
+            <a:endParaRPr lang="en-GB"/>
           </a:p>
         </p:txBody>
       </p:sp>
@@ -1047,18 +1047,18 @@
           <a:bodyPr/>
           <a:lstStyle/>
           <a:p>
-            <a:fld id="{D0100814-528C-1E43-A96A-17574B552906}" type="slidenum">
-              <a:rPr lang="en-FI" smtClean="0"/>
+            <a:fld id="{176483DE-1650-D24E-B86E-522C5B187573}" type="slidenum">
+              <a:rPr lang="en-GB" smtClean="0"/>
               <a:t>‹#›</a:t>
             </a:fld>
-            <a:endParaRPr lang="en-FI"/>
+            <a:endParaRPr lang="en-GB"/>
           </a:p>
         </p:txBody>
       </p:sp>
     </p:spTree>
     <p:extLst>
       <p:ext uri="{BB962C8B-B14F-4D97-AF65-F5344CB8AC3E}">
-        <p14:creationId xmlns:p14="http://schemas.microsoft.com/office/powerpoint/2010/main" val="4195195624"/>
+        <p14:creationId xmlns:p14="http://schemas.microsoft.com/office/powerpoint/2010/main" val="360889180"/>
       </p:ext>
     </p:extLst>
   </p:cSld>
@@ -1237,11 +1237,11 @@
           <a:bodyPr/>
           <a:lstStyle/>
           <a:p>
-            <a:fld id="{9F950D6D-D638-944C-997A-9DAC4E6CC4FC}" type="datetimeFigureOut">
-              <a:rPr lang="en-FI" smtClean="0"/>
-              <a:t>10.3.2022</a:t>
+            <a:fld id="{A8964ADD-0953-8940-9E96-FB0BF4E5F7EB}" type="datetimeFigureOut">
+              <a:rPr lang="en-GB" smtClean="0"/>
+              <a:t>12/04/2022</a:t>
             </a:fld>
-            <a:endParaRPr lang="en-FI"/>
+            <a:endParaRPr lang="en-GB"/>
           </a:p>
         </p:txBody>
       </p:sp>
@@ -1260,7 +1260,7 @@
           <a:bodyPr/>
           <a:lstStyle/>
           <a:p>
-            <a:endParaRPr lang="en-FI"/>
+            <a:endParaRPr lang="en-GB"/>
           </a:p>
         </p:txBody>
       </p:sp>
@@ -1279,18 +1279,18 @@
           <a:bodyPr/>
           <a:lstStyle/>
           <a:p>
-            <a:fld id="{D0100814-528C-1E43-A96A-17574B552906}" type="slidenum">
-              <a:rPr lang="en-FI" smtClean="0"/>
+            <a:fld id="{176483DE-1650-D24E-B86E-522C5B187573}" type="slidenum">
+              <a:rPr lang="en-GB" smtClean="0"/>
               <a:t>‹#›</a:t>
             </a:fld>
-            <a:endParaRPr lang="en-FI"/>
+            <a:endParaRPr lang="en-GB"/>
           </a:p>
         </p:txBody>
       </p:sp>
     </p:spTree>
     <p:extLst>
       <p:ext uri="{BB962C8B-B14F-4D97-AF65-F5344CB8AC3E}">
-        <p14:creationId xmlns:p14="http://schemas.microsoft.com/office/powerpoint/2010/main" val="773376349"/>
+        <p14:creationId xmlns:p14="http://schemas.microsoft.com/office/powerpoint/2010/main" val="63663753"/>
       </p:ext>
     </p:extLst>
   </p:cSld>
@@ -1604,11 +1604,11 @@
           <a:bodyPr/>
           <a:lstStyle/>
           <a:p>
-            <a:fld id="{9F950D6D-D638-944C-997A-9DAC4E6CC4FC}" type="datetimeFigureOut">
-              <a:rPr lang="en-FI" smtClean="0"/>
-              <a:t>10.3.2022</a:t>
+            <a:fld id="{A8964ADD-0953-8940-9E96-FB0BF4E5F7EB}" type="datetimeFigureOut">
+              <a:rPr lang="en-GB" smtClean="0"/>
+              <a:t>12/04/2022</a:t>
             </a:fld>
-            <a:endParaRPr lang="en-FI"/>
+            <a:endParaRPr lang="en-GB"/>
           </a:p>
         </p:txBody>
       </p:sp>
@@ -1627,7 +1627,7 @@
           <a:bodyPr/>
           <a:lstStyle/>
           <a:p>
-            <a:endParaRPr lang="en-FI"/>
+            <a:endParaRPr lang="en-GB"/>
           </a:p>
         </p:txBody>
       </p:sp>
@@ -1646,18 +1646,18 @@
           <a:bodyPr/>
           <a:lstStyle/>
           <a:p>
-            <a:fld id="{D0100814-528C-1E43-A96A-17574B552906}" type="slidenum">
-              <a:rPr lang="en-FI" smtClean="0"/>
+            <a:fld id="{176483DE-1650-D24E-B86E-522C5B187573}" type="slidenum">
+              <a:rPr lang="en-GB" smtClean="0"/>
               <a:t>‹#›</a:t>
             </a:fld>
-            <a:endParaRPr lang="en-FI"/>
+            <a:endParaRPr lang="en-GB"/>
           </a:p>
         </p:txBody>
       </p:sp>
     </p:spTree>
     <p:extLst>
       <p:ext uri="{BB962C8B-B14F-4D97-AF65-F5344CB8AC3E}">
-        <p14:creationId xmlns:p14="http://schemas.microsoft.com/office/powerpoint/2010/main" val="3644781674"/>
+        <p14:creationId xmlns:p14="http://schemas.microsoft.com/office/powerpoint/2010/main" val="504943351"/>
       </p:ext>
     </p:extLst>
   </p:cSld>
@@ -1722,11 +1722,11 @@
           <a:bodyPr/>
           <a:lstStyle/>
           <a:p>
-            <a:fld id="{9F950D6D-D638-944C-997A-9DAC4E6CC4FC}" type="datetimeFigureOut">
-              <a:rPr lang="en-FI" smtClean="0"/>
-              <a:t>10.3.2022</a:t>
+            <a:fld id="{A8964ADD-0953-8940-9E96-FB0BF4E5F7EB}" type="datetimeFigureOut">
+              <a:rPr lang="en-GB" smtClean="0"/>
+              <a:t>12/04/2022</a:t>
             </a:fld>
-            <a:endParaRPr lang="en-FI"/>
+            <a:endParaRPr lang="en-GB"/>
           </a:p>
         </p:txBody>
       </p:sp>
@@ -1745,7 +1745,7 @@
           <a:bodyPr/>
           <a:lstStyle/>
           <a:p>
-            <a:endParaRPr lang="en-FI"/>
+            <a:endParaRPr lang="en-GB"/>
           </a:p>
         </p:txBody>
       </p:sp>
@@ -1764,18 +1764,18 @@
           <a:bodyPr/>
           <a:lstStyle/>
           <a:p>
-            <a:fld id="{D0100814-528C-1E43-A96A-17574B552906}" type="slidenum">
-              <a:rPr lang="en-FI" smtClean="0"/>
+            <a:fld id="{176483DE-1650-D24E-B86E-522C5B187573}" type="slidenum">
+              <a:rPr lang="en-GB" smtClean="0"/>
               <a:t>‹#›</a:t>
             </a:fld>
-            <a:endParaRPr lang="en-FI"/>
+            <a:endParaRPr lang="en-GB"/>
           </a:p>
         </p:txBody>
       </p:sp>
     </p:spTree>
     <p:extLst>
       <p:ext uri="{BB962C8B-B14F-4D97-AF65-F5344CB8AC3E}">
-        <p14:creationId xmlns:p14="http://schemas.microsoft.com/office/powerpoint/2010/main" val="2427888140"/>
+        <p14:creationId xmlns:p14="http://schemas.microsoft.com/office/powerpoint/2010/main" val="1740552528"/>
       </p:ext>
     </p:extLst>
   </p:cSld>
@@ -1817,11 +1817,11 @@
           <a:bodyPr/>
           <a:lstStyle/>
           <a:p>
-            <a:fld id="{9F950D6D-D638-944C-997A-9DAC4E6CC4FC}" type="datetimeFigureOut">
-              <a:rPr lang="en-FI" smtClean="0"/>
-              <a:t>10.3.2022</a:t>
+            <a:fld id="{A8964ADD-0953-8940-9E96-FB0BF4E5F7EB}" type="datetimeFigureOut">
+              <a:rPr lang="en-GB" smtClean="0"/>
+              <a:t>12/04/2022</a:t>
             </a:fld>
-            <a:endParaRPr lang="en-FI"/>
+            <a:endParaRPr lang="en-GB"/>
           </a:p>
         </p:txBody>
       </p:sp>
@@ -1840,7 +1840,7 @@
           <a:bodyPr/>
           <a:lstStyle/>
           <a:p>
-            <a:endParaRPr lang="en-FI"/>
+            <a:endParaRPr lang="en-GB"/>
           </a:p>
         </p:txBody>
       </p:sp>
@@ -1859,18 +1859,18 @@
           <a:bodyPr/>
           <a:lstStyle/>
           <a:p>
-            <a:fld id="{D0100814-528C-1E43-A96A-17574B552906}" type="slidenum">
-              <a:rPr lang="en-FI" smtClean="0"/>
+            <a:fld id="{176483DE-1650-D24E-B86E-522C5B187573}" type="slidenum">
+              <a:rPr lang="en-GB" smtClean="0"/>
               <a:t>‹#›</a:t>
             </a:fld>
-            <a:endParaRPr lang="en-FI"/>
+            <a:endParaRPr lang="en-GB"/>
           </a:p>
         </p:txBody>
       </p:sp>
     </p:spTree>
     <p:extLst>
       <p:ext uri="{BB962C8B-B14F-4D97-AF65-F5344CB8AC3E}">
-        <p14:creationId xmlns:p14="http://schemas.microsoft.com/office/powerpoint/2010/main" val="3622331064"/>
+        <p14:creationId xmlns:p14="http://schemas.microsoft.com/office/powerpoint/2010/main" val="4058130480"/>
       </p:ext>
     </p:extLst>
   </p:cSld>
@@ -2094,11 +2094,11 @@
           <a:bodyPr/>
           <a:lstStyle/>
           <a:p>
-            <a:fld id="{9F950D6D-D638-944C-997A-9DAC4E6CC4FC}" type="datetimeFigureOut">
-              <a:rPr lang="en-FI" smtClean="0"/>
-              <a:t>10.3.2022</a:t>
+            <a:fld id="{A8964ADD-0953-8940-9E96-FB0BF4E5F7EB}" type="datetimeFigureOut">
+              <a:rPr lang="en-GB" smtClean="0"/>
+              <a:t>12/04/2022</a:t>
             </a:fld>
-            <a:endParaRPr lang="en-FI"/>
+            <a:endParaRPr lang="en-GB"/>
           </a:p>
         </p:txBody>
       </p:sp>
@@ -2117,7 +2117,7 @@
           <a:bodyPr/>
           <a:lstStyle/>
           <a:p>
-            <a:endParaRPr lang="en-FI"/>
+            <a:endParaRPr lang="en-GB"/>
           </a:p>
         </p:txBody>
       </p:sp>
@@ -2136,18 +2136,18 @@
           <a:bodyPr/>
           <a:lstStyle/>
           <a:p>
-            <a:fld id="{D0100814-528C-1E43-A96A-17574B552906}" type="slidenum">
-              <a:rPr lang="en-FI" smtClean="0"/>
+            <a:fld id="{176483DE-1650-D24E-B86E-522C5B187573}" type="slidenum">
+              <a:rPr lang="en-GB" smtClean="0"/>
               <a:t>‹#›</a:t>
             </a:fld>
-            <a:endParaRPr lang="en-FI"/>
+            <a:endParaRPr lang="en-GB"/>
           </a:p>
         </p:txBody>
       </p:sp>
     </p:spTree>
     <p:extLst>
       <p:ext uri="{BB962C8B-B14F-4D97-AF65-F5344CB8AC3E}">
-        <p14:creationId xmlns:p14="http://schemas.microsoft.com/office/powerpoint/2010/main" val="1770873422"/>
+        <p14:creationId xmlns:p14="http://schemas.microsoft.com/office/powerpoint/2010/main" val="902553607"/>
       </p:ext>
     </p:extLst>
   </p:cSld>
@@ -2351,11 +2351,11 @@
           <a:bodyPr/>
           <a:lstStyle/>
           <a:p>
-            <a:fld id="{9F950D6D-D638-944C-997A-9DAC4E6CC4FC}" type="datetimeFigureOut">
-              <a:rPr lang="en-FI" smtClean="0"/>
-              <a:t>10.3.2022</a:t>
+            <a:fld id="{A8964ADD-0953-8940-9E96-FB0BF4E5F7EB}" type="datetimeFigureOut">
+              <a:rPr lang="en-GB" smtClean="0"/>
+              <a:t>12/04/2022</a:t>
             </a:fld>
-            <a:endParaRPr lang="en-FI"/>
+            <a:endParaRPr lang="en-GB"/>
           </a:p>
         </p:txBody>
       </p:sp>
@@ -2374,7 +2374,7 @@
           <a:bodyPr/>
           <a:lstStyle/>
           <a:p>
-            <a:endParaRPr lang="en-FI"/>
+            <a:endParaRPr lang="en-GB"/>
           </a:p>
         </p:txBody>
       </p:sp>
@@ -2393,18 +2393,18 @@
           <a:bodyPr/>
           <a:lstStyle/>
           <a:p>
-            <a:fld id="{D0100814-528C-1E43-A96A-17574B552906}" type="slidenum">
-              <a:rPr lang="en-FI" smtClean="0"/>
+            <a:fld id="{176483DE-1650-D24E-B86E-522C5B187573}" type="slidenum">
+              <a:rPr lang="en-GB" smtClean="0"/>
               <a:t>‹#›</a:t>
             </a:fld>
-            <a:endParaRPr lang="en-FI"/>
+            <a:endParaRPr lang="en-GB"/>
           </a:p>
         </p:txBody>
       </p:sp>
     </p:spTree>
     <p:extLst>
       <p:ext uri="{BB962C8B-B14F-4D97-AF65-F5344CB8AC3E}">
-        <p14:creationId xmlns:p14="http://schemas.microsoft.com/office/powerpoint/2010/main" val="3301931278"/>
+        <p14:creationId xmlns:p14="http://schemas.microsoft.com/office/powerpoint/2010/main" val="2616903146"/>
       </p:ext>
     </p:extLst>
   </p:cSld>
@@ -2564,11 +2564,11 @@
             </a:lvl1pPr>
           </a:lstStyle>
           <a:p>
-            <a:fld id="{9F950D6D-D638-944C-997A-9DAC4E6CC4FC}" type="datetimeFigureOut">
-              <a:rPr lang="en-FI" smtClean="0"/>
-              <a:t>10.3.2022</a:t>
+            <a:fld id="{A8964ADD-0953-8940-9E96-FB0BF4E5F7EB}" type="datetimeFigureOut">
+              <a:rPr lang="en-GB" smtClean="0"/>
+              <a:t>12/04/2022</a:t>
             </a:fld>
-            <a:endParaRPr lang="en-FI"/>
+            <a:endParaRPr lang="en-GB"/>
           </a:p>
         </p:txBody>
       </p:sp>
@@ -2605,7 +2605,7 @@
             </a:lvl1pPr>
           </a:lstStyle>
           <a:p>
-            <a:endParaRPr lang="en-FI"/>
+            <a:endParaRPr lang="en-GB"/>
           </a:p>
         </p:txBody>
       </p:sp>
@@ -2642,18 +2642,18 @@
             </a:lvl1pPr>
           </a:lstStyle>
           <a:p>
-            <a:fld id="{D0100814-528C-1E43-A96A-17574B552906}" type="slidenum">
-              <a:rPr lang="en-FI" smtClean="0"/>
+            <a:fld id="{176483DE-1650-D24E-B86E-522C5B187573}" type="slidenum">
+              <a:rPr lang="en-GB" smtClean="0"/>
               <a:t>‹#›</a:t>
             </a:fld>
-            <a:endParaRPr lang="en-FI"/>
+            <a:endParaRPr lang="en-GB"/>
           </a:p>
         </p:txBody>
       </p:sp>
     </p:spTree>
     <p:extLst>
       <p:ext uri="{BB962C8B-B14F-4D97-AF65-F5344CB8AC3E}">
-        <p14:creationId xmlns:p14="http://schemas.microsoft.com/office/powerpoint/2010/main" val="2025593102"/>
+        <p14:creationId xmlns:p14="http://schemas.microsoft.com/office/powerpoint/2010/main" val="1969707913"/>
       </p:ext>
     </p:extLst>
   </p:cSld>
@@ -2973,10 +2973,10 @@
       </p:grpSpPr>
       <p:pic>
         <p:nvPicPr>
-          <p:cNvPr id="3" name="Picture 2">
+          <p:cNvPr id="22" name="Picture 21">
             <a:extLst>
               <a:ext uri="{FF2B5EF4-FFF2-40B4-BE49-F238E27FC236}">
-                <a16:creationId xmlns:a16="http://schemas.microsoft.com/office/drawing/2014/main" id="{31F2206B-F06B-3C49-A199-8E41DCDF29C1}"/>
+                <a16:creationId xmlns:a16="http://schemas.microsoft.com/office/drawing/2014/main" id="{F1A1B6E4-D185-A849-BB40-B2ACB2359099}"/>
               </a:ext>
             </a:extLst>
           </p:cNvPr>
@@ -2985,16 +2985,15 @@
           </p:cNvPicPr>
           <p:nvPr/>
         </p:nvPicPr>
-        <p:blipFill>
+        <p:blipFill rotWithShape="1">
           <a:blip r:embed="rId2"/>
-          <a:stretch>
-            <a:fillRect/>
-          </a:stretch>
+          <a:srcRect l="3543" t="4117" r="3517" b="3769"/>
+          <a:stretch/>
         </p:blipFill>
         <p:spPr>
           <a:xfrm>
-            <a:off x="2792343" y="0"/>
-            <a:ext cx="4051273" cy="4051273"/>
+            <a:off x="2835870" y="8036600"/>
+            <a:ext cx="4027853" cy="3992081"/>
           </a:xfrm>
           <a:prstGeom prst="rect">
             <a:avLst/>
@@ -3003,10 +3002,10 @@
       </p:pic>
       <p:pic>
         <p:nvPicPr>
-          <p:cNvPr id="6" name="Picture 5">
+          <p:cNvPr id="7" name="Picture 6">
             <a:extLst>
               <a:ext uri="{FF2B5EF4-FFF2-40B4-BE49-F238E27FC236}">
-                <a16:creationId xmlns:a16="http://schemas.microsoft.com/office/drawing/2014/main" id="{9BD984E7-6C69-2346-8B69-835B1D01DFF4}"/>
+                <a16:creationId xmlns:a16="http://schemas.microsoft.com/office/drawing/2014/main" id="{39B9CA4C-893E-8F44-9DEC-D0A0E5E7D256}"/>
               </a:ext>
             </a:extLst>
           </p:cNvPr>
@@ -3015,28 +3014,138 @@
           </p:cNvPicPr>
           <p:nvPr/>
         </p:nvPicPr>
-        <p:blipFill>
+        <p:blipFill rotWithShape="1">
           <a:blip r:embed="rId3"/>
-          <a:stretch>
-            <a:fillRect/>
-          </a:stretch>
+          <a:srcRect l="5553" t="5080" r="5080" b="6350"/>
+          <a:stretch/>
         </p:blipFill>
         <p:spPr>
           <a:xfrm>
-            <a:off x="2806727" y="4051273"/>
-            <a:ext cx="4051273" cy="4051273"/>
+            <a:off x="2835870" y="4044519"/>
+            <a:ext cx="4027853" cy="3992081"/>
           </a:xfrm>
           <a:prstGeom prst="rect">
             <a:avLst/>
           </a:prstGeom>
         </p:spPr>
       </p:pic>
+      <p:sp>
+        <p:nvSpPr>
+          <p:cNvPr id="10" name="TextBox 9">
+            <a:extLst>
+              <a:ext uri="{FF2B5EF4-FFF2-40B4-BE49-F238E27FC236}">
+                <a16:creationId xmlns:a16="http://schemas.microsoft.com/office/drawing/2014/main" id="{1DEAB816-4EAE-904F-A035-655621EFA3CF}"/>
+              </a:ext>
+            </a:extLst>
+          </p:cNvPr>
+          <p:cNvSpPr txBox="1"/>
+          <p:nvPr/>
+        </p:nvSpPr>
+        <p:spPr>
+          <a:xfrm>
+            <a:off x="2337524" y="-30750"/>
+            <a:ext cx="356188" cy="461665"/>
+          </a:xfrm>
+          <a:prstGeom prst="rect">
+            <a:avLst/>
+          </a:prstGeom>
+          <a:noFill/>
+        </p:spPr>
+        <p:txBody>
+          <a:bodyPr wrap="none" rtlCol="0">
+            <a:spAutoFit/>
+          </a:bodyPr>
+          <a:lstStyle/>
+          <a:p>
+            <a:r>
+              <a:rPr lang="en-GB" sz="2400" b="1" dirty="0">
+                <a:latin typeface="Helvetica" pitchFamily="2" charset="0"/>
+              </a:rPr>
+              <a:t>a</a:t>
+            </a:r>
+          </a:p>
+        </p:txBody>
+      </p:sp>
+      <p:sp>
+        <p:nvSpPr>
+          <p:cNvPr id="11" name="TextBox 10">
+            <a:extLst>
+              <a:ext uri="{FF2B5EF4-FFF2-40B4-BE49-F238E27FC236}">
+                <a16:creationId xmlns:a16="http://schemas.microsoft.com/office/drawing/2014/main" id="{A1D0779A-3DD1-6742-85B3-58DE391A5758}"/>
+              </a:ext>
+            </a:extLst>
+          </p:cNvPr>
+          <p:cNvSpPr txBox="1"/>
+          <p:nvPr/>
+        </p:nvSpPr>
+        <p:spPr>
+          <a:xfrm>
+            <a:off x="2329509" y="3924567"/>
+            <a:ext cx="372218" cy="461665"/>
+          </a:xfrm>
+          <a:prstGeom prst="rect">
+            <a:avLst/>
+          </a:prstGeom>
+          <a:noFill/>
+        </p:spPr>
+        <p:txBody>
+          <a:bodyPr wrap="square" rtlCol="0">
+            <a:spAutoFit/>
+          </a:bodyPr>
+          <a:lstStyle/>
+          <a:p>
+            <a:r>
+              <a:rPr lang="en-GB" sz="2400" b="1" dirty="0">
+                <a:latin typeface="Helvetica" pitchFamily="2" charset="0"/>
+              </a:rPr>
+              <a:t>b</a:t>
+            </a:r>
+          </a:p>
+        </p:txBody>
+      </p:sp>
+      <p:sp>
+        <p:nvSpPr>
+          <p:cNvPr id="12" name="TextBox 11">
+            <a:extLst>
+              <a:ext uri="{FF2B5EF4-FFF2-40B4-BE49-F238E27FC236}">
+                <a16:creationId xmlns:a16="http://schemas.microsoft.com/office/drawing/2014/main" id="{A16E1948-818A-8E4E-B49A-FFD2700D4751}"/>
+              </a:ext>
+            </a:extLst>
+          </p:cNvPr>
+          <p:cNvSpPr txBox="1"/>
+          <p:nvPr/>
+        </p:nvSpPr>
+        <p:spPr>
+          <a:xfrm>
+            <a:off x="2337524" y="7989242"/>
+            <a:ext cx="356188" cy="461665"/>
+          </a:xfrm>
+          <a:prstGeom prst="rect">
+            <a:avLst/>
+          </a:prstGeom>
+          <a:noFill/>
+        </p:spPr>
+        <p:txBody>
+          <a:bodyPr wrap="none" rtlCol="0">
+            <a:spAutoFit/>
+          </a:bodyPr>
+          <a:lstStyle/>
+          <a:p>
+            <a:r>
+              <a:rPr lang="en-GB" sz="2400" b="1" dirty="0">
+                <a:latin typeface="Helvetica" pitchFamily="2" charset="0"/>
+              </a:rPr>
+              <a:t>c</a:t>
+            </a:r>
+          </a:p>
+        </p:txBody>
+      </p:sp>
       <p:pic>
         <p:nvPicPr>
-          <p:cNvPr id="13" name="Picture 12">
+          <p:cNvPr id="24" name="Picture 23">
             <a:extLst>
               <a:ext uri="{FF2B5EF4-FFF2-40B4-BE49-F238E27FC236}">
-                <a16:creationId xmlns:a16="http://schemas.microsoft.com/office/drawing/2014/main" id="{C459255D-6AFA-0F44-9B6F-3FDA5F8AEC84}"/>
+                <a16:creationId xmlns:a16="http://schemas.microsoft.com/office/drawing/2014/main" id="{BCE2262A-30E3-6D4F-ACC0-4016450B2B6E}"/>
               </a:ext>
             </a:extLst>
           </p:cNvPr>
@@ -3045,146 +3154,25 @@
           </p:cNvPicPr>
           <p:nvPr/>
         </p:nvPicPr>
-        <p:blipFill>
+        <p:blipFill rotWithShape="1">
           <a:blip r:embed="rId4"/>
-          <a:stretch>
-            <a:fillRect/>
-          </a:stretch>
+          <a:srcRect l="5036" t="3411" r="4110" b="5426"/>
+          <a:stretch/>
         </p:blipFill>
         <p:spPr>
           <a:xfrm>
-            <a:off x="2785931" y="8102546"/>
-            <a:ext cx="4051273" cy="4051273"/>
+            <a:off x="2800515" y="0"/>
+            <a:ext cx="4057486" cy="4071334"/>
           </a:xfrm>
           <a:prstGeom prst="rect">
             <a:avLst/>
           </a:prstGeom>
         </p:spPr>
       </p:pic>
-      <p:sp>
-        <p:nvSpPr>
-          <p:cNvPr id="10" name="TextBox 9">
-            <a:extLst>
-              <a:ext uri="{FF2B5EF4-FFF2-40B4-BE49-F238E27FC236}">
-                <a16:creationId xmlns:a16="http://schemas.microsoft.com/office/drawing/2014/main" id="{398FE752-7828-8C42-8B52-1300418C132F}"/>
-              </a:ext>
-            </a:extLst>
-          </p:cNvPr>
-          <p:cNvSpPr txBox="1"/>
-          <p:nvPr/>
-        </p:nvSpPr>
-        <p:spPr>
-          <a:xfrm>
-            <a:off x="2635890" y="203477"/>
-            <a:ext cx="312906" cy="369332"/>
-          </a:xfrm>
-          <a:prstGeom prst="rect">
-            <a:avLst/>
-          </a:prstGeom>
-          <a:noFill/>
-        </p:spPr>
-        <p:txBody>
-          <a:bodyPr wrap="none" rtlCol="0">
-            <a:spAutoFit/>
-          </a:bodyPr>
-          <a:lstStyle/>
-          <a:p>
-            <a:r>
-              <a:rPr lang="en-GB" b="1" dirty="0">
-                <a:latin typeface="Helvetica" pitchFamily="2" charset="0"/>
-              </a:rPr>
-              <a:t>a</a:t>
-            </a:r>
-            <a:endParaRPr lang="en-FI" b="1" dirty="0">
-              <a:latin typeface="Helvetica" pitchFamily="2" charset="0"/>
-            </a:endParaRPr>
-          </a:p>
-        </p:txBody>
-      </p:sp>
-      <p:sp>
-        <p:nvSpPr>
-          <p:cNvPr id="11" name="TextBox 10">
-            <a:extLst>
-              <a:ext uri="{FF2B5EF4-FFF2-40B4-BE49-F238E27FC236}">
-                <a16:creationId xmlns:a16="http://schemas.microsoft.com/office/drawing/2014/main" id="{2BE68A58-F8C7-D44E-A4E6-D95A7382DD85}"/>
-              </a:ext>
-            </a:extLst>
-          </p:cNvPr>
-          <p:cNvSpPr txBox="1"/>
-          <p:nvPr/>
-        </p:nvSpPr>
-        <p:spPr>
-          <a:xfrm>
-            <a:off x="2623066" y="4051273"/>
-            <a:ext cx="325730" cy="369332"/>
-          </a:xfrm>
-          <a:prstGeom prst="rect">
-            <a:avLst/>
-          </a:prstGeom>
-          <a:noFill/>
-        </p:spPr>
-        <p:txBody>
-          <a:bodyPr wrap="none" rtlCol="0">
-            <a:spAutoFit/>
-          </a:bodyPr>
-          <a:lstStyle/>
-          <a:p>
-            <a:r>
-              <a:rPr lang="en-GB" b="1" dirty="0">
-                <a:latin typeface="Helvetica" pitchFamily="2" charset="0"/>
-              </a:rPr>
-              <a:t>b</a:t>
-            </a:r>
-            <a:endParaRPr lang="en-FI" b="1" dirty="0">
-              <a:latin typeface="Helvetica" pitchFamily="2" charset="0"/>
-            </a:endParaRPr>
-          </a:p>
-        </p:txBody>
-      </p:sp>
-      <p:sp>
-        <p:nvSpPr>
-          <p:cNvPr id="12" name="TextBox 11">
-            <a:extLst>
-              <a:ext uri="{FF2B5EF4-FFF2-40B4-BE49-F238E27FC236}">
-                <a16:creationId xmlns:a16="http://schemas.microsoft.com/office/drawing/2014/main" id="{A509BD38-E8AE-9542-AE2B-8C1DE478414E}"/>
-              </a:ext>
-            </a:extLst>
-          </p:cNvPr>
-          <p:cNvSpPr txBox="1"/>
-          <p:nvPr/>
-        </p:nvSpPr>
-        <p:spPr>
-          <a:xfrm>
-            <a:off x="2643153" y="7884224"/>
-            <a:ext cx="312906" cy="369332"/>
-          </a:xfrm>
-          <a:prstGeom prst="rect">
-            <a:avLst/>
-          </a:prstGeom>
-          <a:noFill/>
-        </p:spPr>
-        <p:txBody>
-          <a:bodyPr wrap="none" rtlCol="0">
-            <a:spAutoFit/>
-          </a:bodyPr>
-          <a:lstStyle/>
-          <a:p>
-            <a:r>
-              <a:rPr lang="en-GB" b="1" dirty="0">
-                <a:latin typeface="Helvetica" pitchFamily="2" charset="0"/>
-              </a:rPr>
-              <a:t>c</a:t>
-            </a:r>
-            <a:endParaRPr lang="en-FI" b="1" dirty="0">
-              <a:latin typeface="Helvetica" pitchFamily="2" charset="0"/>
-            </a:endParaRPr>
-          </a:p>
-        </p:txBody>
-      </p:sp>
     </p:spTree>
     <p:extLst>
       <p:ext uri="{BB962C8B-B14F-4D97-AF65-F5344CB8AC3E}">
-        <p14:creationId xmlns:p14="http://schemas.microsoft.com/office/powerpoint/2010/main" val="2889458058"/>
+        <p14:creationId xmlns:p14="http://schemas.microsoft.com/office/powerpoint/2010/main" val="1054392799"/>
       </p:ext>
     </p:extLst>
   </p:cSld>

</xml_diff>

<commit_message>
combine plots for figure 4
</commit_message>
<xml_diff>
--- a/plots/Fig4.pptx
+++ b/plots/Fig4.pptx
@@ -2975,10 +2975,10 @@
       </p:grpSpPr>
       <p:pic>
         <p:nvPicPr>
-          <p:cNvPr id="5" name="Picture 4">
+          <p:cNvPr id="15" name="Picture 14">
             <a:extLst>
               <a:ext uri="{FF2B5EF4-FFF2-40B4-BE49-F238E27FC236}">
-                <a16:creationId xmlns:a16="http://schemas.microsoft.com/office/drawing/2014/main" id="{8239FE6E-2E7D-73A7-1A60-703082C9AF8F}"/>
+                <a16:creationId xmlns:a16="http://schemas.microsoft.com/office/drawing/2014/main" id="{E23722C8-9AF5-F60A-23BB-B170A810E43D}"/>
               </a:ext>
             </a:extLst>
           </p:cNvPr>
@@ -2995,7 +2995,37 @@
         </p:blipFill>
         <p:spPr>
           <a:xfrm>
-            <a:off x="-1" y="3057160"/>
+            <a:off x="0" y="3055155"/>
+            <a:ext cx="3115041" cy="3115041"/>
+          </a:xfrm>
+          <a:prstGeom prst="rect">
+            <a:avLst/>
+          </a:prstGeom>
+        </p:spPr>
+      </p:pic>
+      <p:pic>
+        <p:nvPicPr>
+          <p:cNvPr id="3" name="Picture 2">
+            <a:extLst>
+              <a:ext uri="{FF2B5EF4-FFF2-40B4-BE49-F238E27FC236}">
+                <a16:creationId xmlns:a16="http://schemas.microsoft.com/office/drawing/2014/main" id="{D9EC1BEF-DFD1-5DCD-E84F-DD1EFEFED7E0}"/>
+              </a:ext>
+            </a:extLst>
+          </p:cNvPr>
+          <p:cNvPicPr>
+            <a:picLocks noChangeAspect="1"/>
+          </p:cNvPicPr>
+          <p:nvPr/>
+        </p:nvPicPr>
+        <p:blipFill>
+          <a:blip r:embed="rId3"/>
+          <a:stretch>
+            <a:fillRect/>
+          </a:stretch>
+        </p:blipFill>
+        <p:spPr>
+          <a:xfrm>
+            <a:off x="3113037" y="3057159"/>
             <a:ext cx="3113037" cy="3113037"/>
           </a:xfrm>
           <a:prstGeom prst="rect">
@@ -3018,7 +3048,7 @@
           <p:nvPr/>
         </p:nvPicPr>
         <p:blipFill>
-          <a:blip r:embed="rId3"/>
+          <a:blip r:embed="rId4"/>
           <a:stretch>
             <a:fillRect/>
           </a:stretch>
@@ -3048,7 +3078,7 @@
           <p:nvPr/>
         </p:nvPicPr>
         <p:blipFill>
-          <a:blip r:embed="rId4"/>
+          <a:blip r:embed="rId5"/>
           <a:stretch>
             <a:fillRect/>
           </a:stretch>
@@ -3174,36 +3204,6 @@
           </a:p>
         </p:txBody>
       </p:sp>
-      <p:pic>
-        <p:nvPicPr>
-          <p:cNvPr id="6" name="Picture 5">
-            <a:extLst>
-              <a:ext uri="{FF2B5EF4-FFF2-40B4-BE49-F238E27FC236}">
-                <a16:creationId xmlns:a16="http://schemas.microsoft.com/office/drawing/2014/main" id="{FFFDC6CC-519B-DD18-B726-61BE12EDD2DC}"/>
-              </a:ext>
-            </a:extLst>
-          </p:cNvPr>
-          <p:cNvPicPr>
-            <a:picLocks noChangeAspect="1"/>
-          </p:cNvPicPr>
-          <p:nvPr/>
-        </p:nvPicPr>
-        <p:blipFill>
-          <a:blip r:embed="rId5"/>
-          <a:stretch>
-            <a:fillRect/>
-          </a:stretch>
-        </p:blipFill>
-        <p:spPr>
-          <a:xfrm>
-            <a:off x="3113036" y="3113037"/>
-            <a:ext cx="3113037" cy="3113037"/>
-          </a:xfrm>
-          <a:prstGeom prst="rect">
-            <a:avLst/>
-          </a:prstGeom>
-        </p:spPr>
-      </p:pic>
       <p:sp>
         <p:nvSpPr>
           <p:cNvPr id="8" name="TextBox 7">

</xml_diff>